<commit_message>
fichiers css mise à jour
</commit_message>
<xml_diff>
--- a/projet_6_presentation.pptx
+++ b/projet_6_presentation.pptx
@@ -19,6 +19,8 @@
     <p:sldId id="266" r:id="rId13"/>
     <p:sldId id="268" r:id="rId14"/>
     <p:sldId id="269" r:id="rId15"/>
+    <p:sldId id="270" r:id="rId16"/>
+    <p:sldId id="271" r:id="rId17"/>
   </p:sldIdLst>
   <p:sldSz cx="12192000" cy="6858000"/>
   <p:notesSz cx="6858000" cy="9144000"/>
@@ -117,6 +119,11 @@
       </a:defRPr>
     </a:lvl9pPr>
   </p:defaultTextStyle>
+  <p:extLst>
+    <p:ext uri="{EFAFB233-063F-42B5-8137-9DF3F51BA10A}">
+      <p15:sldGuideLst xmlns:p15="http://schemas.microsoft.com/office/powerpoint/2012/main"/>
+    </p:ext>
+  </p:extLst>
 </p:presentation>
 </file>
 
@@ -3370,31 +3377,6 @@
           </a:p>
         </p:txBody>
       </p:sp>
-      <p:sp>
-        <p:nvSpPr>
-          <p:cNvPr id="3" name="Sous-titre 2">
-            <a:extLst>
-              <a:ext uri="{FF2B5EF4-FFF2-40B4-BE49-F238E27FC236}">
-                <a16:creationId xmlns:a16="http://schemas.microsoft.com/office/drawing/2014/main" id="{2B86ADB7-F09A-5201-7A59-54285B51B461}"/>
-              </a:ext>
-            </a:extLst>
-          </p:cNvPr>
-          <p:cNvSpPr>
-            <a:spLocks noGrp="1"/>
-          </p:cNvSpPr>
-          <p:nvPr>
-            <p:ph type="subTitle" idx="1"/>
-          </p:nvPr>
-        </p:nvSpPr>
-        <p:spPr/>
-        <p:txBody>
-          <a:bodyPr/>
-          <a:lstStyle/>
-          <a:p>
-            <a:endParaRPr lang="fr-FR" dirty="0"/>
-          </a:p>
-        </p:txBody>
-      </p:sp>
     </p:spTree>
     <p:extLst>
       <p:ext uri="{BB962C8B-B14F-4D97-AF65-F5344CB8AC3E}">
@@ -3831,6 +3813,305 @@
     <p:extLst>
       <p:ext uri="{BB962C8B-B14F-4D97-AF65-F5344CB8AC3E}">
         <p14:creationId xmlns:p14="http://schemas.microsoft.com/office/powerpoint/2010/main" val="188538950"/>
+      </p:ext>
+    </p:extLst>
+  </p:cSld>
+  <p:clrMapOvr>
+    <a:masterClrMapping/>
+  </p:clrMapOvr>
+</p:sld>
+</file>
+
+<file path=ppt/slides/slide15.xml><?xml version="1.0" encoding="utf-8"?>
+<p:sld xmlns:a="http://schemas.openxmlformats.org/drawingml/2006/main" xmlns:r="http://schemas.openxmlformats.org/officeDocument/2006/relationships" xmlns:p="http://schemas.openxmlformats.org/presentationml/2006/main">
+  <p:cSld>
+    <p:spTree>
+      <p:nvGrpSpPr>
+        <p:cNvPr id="1" name=""/>
+        <p:cNvGrpSpPr/>
+        <p:nvPr/>
+      </p:nvGrpSpPr>
+      <p:grpSpPr>
+        <a:xfrm>
+          <a:off x="0" y="0"/>
+          <a:ext cx="0" cy="0"/>
+          <a:chOff x="0" y="0"/>
+          <a:chExt cx="0" cy="0"/>
+        </a:xfrm>
+      </p:grpSpPr>
+      <p:sp>
+        <p:nvSpPr>
+          <p:cNvPr id="2" name="Titre 1">
+            <a:extLst>
+              <a:ext uri="{FF2B5EF4-FFF2-40B4-BE49-F238E27FC236}">
+                <a16:creationId xmlns:a16="http://schemas.microsoft.com/office/drawing/2014/main" id="{8F8859F0-81E4-A20D-B668-B80113691536}"/>
+              </a:ext>
+            </a:extLst>
+          </p:cNvPr>
+          <p:cNvSpPr>
+            <a:spLocks noGrp="1"/>
+          </p:cNvSpPr>
+          <p:nvPr>
+            <p:ph type="title"/>
+          </p:nvPr>
+        </p:nvSpPr>
+        <p:spPr/>
+        <p:txBody>
+          <a:bodyPr/>
+          <a:lstStyle/>
+          <a:p>
+            <a:r>
+              <a:rPr lang="fr-FR" dirty="0"/>
+              <a:t>Etape 4 : Gérer la navigation entre la page accueil et la page photographe</a:t>
+            </a:r>
+          </a:p>
+        </p:txBody>
+      </p:sp>
+      <p:sp>
+        <p:nvSpPr>
+          <p:cNvPr id="3" name="Espace réservé du contenu 2">
+            <a:extLst>
+              <a:ext uri="{FF2B5EF4-FFF2-40B4-BE49-F238E27FC236}">
+                <a16:creationId xmlns:a16="http://schemas.microsoft.com/office/drawing/2014/main" id="{26F15B2E-055F-5A7C-547E-F62912870B8F}"/>
+              </a:ext>
+            </a:extLst>
+          </p:cNvPr>
+          <p:cNvSpPr>
+            <a:spLocks noGrp="1"/>
+          </p:cNvSpPr>
+          <p:nvPr>
+            <p:ph idx="1"/>
+          </p:nvPr>
+        </p:nvSpPr>
+        <p:spPr/>
+        <p:txBody>
+          <a:bodyPr>
+            <a:normAutofit fontScale="92500" lnSpcReduction="10000"/>
+          </a:bodyPr>
+          <a:lstStyle/>
+          <a:p>
+            <a:r>
+              <a:rPr lang="fr-FR" dirty="0"/>
+              <a:t>📌 Recommandations : Ici, vous devrez construire un système permettant de passer du lien cliqué au chargement de la page. Pour cela, vous vous appuierez sur </a:t>
+            </a:r>
+            <a:r>
+              <a:rPr lang="fr-FR" dirty="0" err="1"/>
+              <a:t>l'id</a:t>
+            </a:r>
+            <a:r>
+              <a:rPr lang="fr-FR" dirty="0"/>
+              <a:t> du photographe sur lequel l'utilisateur a cliqué et vous le passerez en paramètre de l'url affichée.</a:t>
+            </a:r>
+          </a:p>
+          <a:p>
+            <a:r>
+              <a:rPr lang="fr-FR" dirty="0"/>
+              <a:t> Vous pouvez commencer par faire un console.log des données correspondant au photographe sélectionné depuis l'URL. </a:t>
+            </a:r>
+          </a:p>
+          <a:p>
+            <a:r>
+              <a:rPr lang="fr-FR" dirty="0"/>
+              <a:t>Vous afficherez ensuite le contenu de la page à la prochaine étape. </a:t>
+            </a:r>
+          </a:p>
+          <a:p>
+            <a:r>
+              <a:rPr lang="fr-FR" dirty="0"/>
+              <a:t>Attention à l'accessibilité de vos liens (aria-label, gérer le focus, etc.) </a:t>
+            </a:r>
+          </a:p>
+          <a:p>
+            <a:r>
+              <a:rPr lang="fr-FR" dirty="0"/>
+              <a:t>Maintenant que vous avez finalisé votre page d'accueil, vous pouvez réaliser un rapport d'accessibilité avec un validateur d'accessibilité ou une checklist, et corriger votre code en fonction </a:t>
+            </a:r>
+          </a:p>
+        </p:txBody>
+      </p:sp>
+    </p:spTree>
+    <p:extLst>
+      <p:ext uri="{BB962C8B-B14F-4D97-AF65-F5344CB8AC3E}">
+        <p14:creationId xmlns:p14="http://schemas.microsoft.com/office/powerpoint/2010/main" val="2148885757"/>
+      </p:ext>
+    </p:extLst>
+  </p:cSld>
+  <p:clrMapOvr>
+    <a:masterClrMapping/>
+  </p:clrMapOvr>
+</p:sld>
+</file>
+
+<file path=ppt/slides/slide16.xml><?xml version="1.0" encoding="utf-8"?>
+<p:sld xmlns:a="http://schemas.openxmlformats.org/drawingml/2006/main" xmlns:r="http://schemas.openxmlformats.org/officeDocument/2006/relationships" xmlns:p="http://schemas.openxmlformats.org/presentationml/2006/main">
+  <p:cSld>
+    <p:spTree>
+      <p:nvGrpSpPr>
+        <p:cNvPr id="1" name=""/>
+        <p:cNvGrpSpPr/>
+        <p:nvPr/>
+      </p:nvGrpSpPr>
+      <p:grpSpPr>
+        <a:xfrm>
+          <a:off x="0" y="0"/>
+          <a:ext cx="0" cy="0"/>
+          <a:chOff x="0" y="0"/>
+          <a:chExt cx="0" cy="0"/>
+        </a:xfrm>
+      </p:grpSpPr>
+      <p:sp>
+        <p:nvSpPr>
+          <p:cNvPr id="2" name="Titre 1">
+            <a:extLst>
+              <a:ext uri="{FF2B5EF4-FFF2-40B4-BE49-F238E27FC236}">
+                <a16:creationId xmlns:a16="http://schemas.microsoft.com/office/drawing/2014/main" id="{ABDDCEAA-51AB-EADB-6DE0-892FBA885673}"/>
+              </a:ext>
+            </a:extLst>
+          </p:cNvPr>
+          <p:cNvSpPr>
+            <a:spLocks noGrp="1"/>
+          </p:cNvSpPr>
+          <p:nvPr>
+            <p:ph type="title"/>
+          </p:nvPr>
+        </p:nvSpPr>
+        <p:spPr/>
+        <p:txBody>
+          <a:bodyPr/>
+          <a:lstStyle/>
+          <a:p>
+            <a:r>
+              <a:rPr lang="fr-FR" dirty="0"/>
+              <a:t>Etape 5 : Afficher le contenu statique de la page photographe</a:t>
+            </a:r>
+          </a:p>
+        </p:txBody>
+      </p:sp>
+      <p:sp>
+        <p:nvSpPr>
+          <p:cNvPr id="3" name="Espace réservé du contenu 2">
+            <a:extLst>
+              <a:ext uri="{FF2B5EF4-FFF2-40B4-BE49-F238E27FC236}">
+                <a16:creationId xmlns:a16="http://schemas.microsoft.com/office/drawing/2014/main" id="{708857B6-B73A-A5E1-617F-AAB213BDB855}"/>
+              </a:ext>
+            </a:extLst>
+          </p:cNvPr>
+          <p:cNvSpPr>
+            <a:spLocks noGrp="1"/>
+          </p:cNvSpPr>
+          <p:nvPr>
+            <p:ph idx="1"/>
+          </p:nvPr>
+        </p:nvSpPr>
+        <p:spPr/>
+        <p:txBody>
+          <a:bodyPr>
+            <a:normAutofit lnSpcReduction="10000"/>
+          </a:bodyPr>
+          <a:lstStyle/>
+          <a:p>
+            <a:pPr marL="0" indent="0">
+              <a:buNone/>
+            </a:pPr>
+            <a:r>
+              <a:rPr lang="fr-FR" dirty="0"/>
+              <a:t>📌 Recommandations :</a:t>
+            </a:r>
+          </a:p>
+          <a:p>
+            <a:pPr marL="0" indent="0">
+              <a:buNone/>
+            </a:pPr>
+            <a:r>
+              <a:rPr lang="fr-FR" dirty="0"/>
+              <a:t>● Vous devrez réutiliser la fonction </a:t>
+            </a:r>
+            <a:r>
+              <a:rPr lang="fr-FR" dirty="0" err="1"/>
+              <a:t>photographer</a:t>
+            </a:r>
+            <a:r>
+              <a:rPr lang="fr-FR" dirty="0"/>
+              <a:t> Template que vous aviez étendu à l'étape 3 pour afficher le contenu de votre page, ainsi que votre fonction permettant d'utiliser </a:t>
+            </a:r>
+            <a:r>
+              <a:rPr lang="fr-FR" dirty="0" err="1"/>
+              <a:t>fetch</a:t>
+            </a:r>
+            <a:r>
+              <a:rPr lang="fr-FR" dirty="0"/>
+              <a:t>. </a:t>
+            </a:r>
+          </a:p>
+          <a:p>
+            <a:pPr marL="0" indent="0">
+              <a:buNone/>
+            </a:pPr>
+            <a:r>
+              <a:rPr lang="fr-FR" dirty="0"/>
+              <a:t>● Vous afficherez également les réalisations des photographes, en créant une </a:t>
+            </a:r>
+            <a:r>
+              <a:rPr lang="fr-FR" dirty="0" err="1"/>
+              <a:t>factory</a:t>
+            </a:r>
+            <a:r>
+              <a:rPr lang="fr-FR" dirty="0"/>
+              <a:t> pour Media. </a:t>
+            </a:r>
+          </a:p>
+          <a:p>
+            <a:pPr marL="0" indent="0">
+              <a:buNone/>
+            </a:pPr>
+            <a:r>
+              <a:rPr lang="fr-FR"/>
+              <a:t>● </a:t>
+            </a:r>
+            <a:r>
+              <a:rPr lang="fr-FR" dirty="0"/>
+              <a:t>N'oubliez pas le petit encart qui affiche le tarif journalier du ou de la photographe affiché</a:t>
+            </a:r>
+            <a:r>
+              <a:rPr lang="fr-FR"/>
+              <a:t>. </a:t>
+            </a:r>
+          </a:p>
+          <a:p>
+            <a:pPr marL="0" indent="0">
+              <a:buNone/>
+            </a:pPr>
+            <a:r>
+              <a:rPr lang="fr-FR"/>
+              <a:t>● </a:t>
+            </a:r>
+            <a:r>
+              <a:rPr lang="fr-FR" dirty="0"/>
+              <a:t>Vous vous occuperez du nombre de likes, de la </a:t>
+            </a:r>
+            <a:r>
+              <a:rPr lang="fr-FR" dirty="0" err="1"/>
+              <a:t>LightBox</a:t>
+            </a:r>
+            <a:r>
+              <a:rPr lang="fr-FR" dirty="0"/>
+              <a:t> et du </a:t>
+            </a:r>
+            <a:r>
+              <a:rPr lang="fr-FR" dirty="0" err="1"/>
+              <a:t>ContactForm</a:t>
+            </a:r>
+            <a:r>
+              <a:rPr lang="fr-FR" dirty="0"/>
+              <a:t> dans une étape ultérieure. </a:t>
+            </a:r>
+          </a:p>
+        </p:txBody>
+      </p:sp>
+    </p:spTree>
+    <p:extLst>
+      <p:ext uri="{BB962C8B-B14F-4D97-AF65-F5344CB8AC3E}">
+        <p14:creationId xmlns:p14="http://schemas.microsoft.com/office/powerpoint/2010/main" val="1178114679"/>
       </p:ext>
     </p:extLst>
   </p:cSld>

</xml_diff>